<commit_message>
fixed up a few things to share with instructors.
</commit_message>
<xml_diff>
--- a/final_project/20181127-final_project_stolen-bikes.pptx
+++ b/final_project/20181127-final_project_stolen-bikes.pptx
@@ -5,7 +5,7 @@
     <p:sldMasterId id="2147483648" r:id="rId1"/>
   </p:sldMasterIdLst>
   <p:notesMasterIdLst>
-    <p:notesMasterId r:id="rId33"/>
+    <p:notesMasterId r:id="rId34"/>
   </p:notesMasterIdLst>
   <p:sldIdLst>
     <p:sldId id="256" r:id="rId2"/>
@@ -34,11 +34,12 @@
     <p:sldId id="289" r:id="rId25"/>
     <p:sldId id="290" r:id="rId26"/>
     <p:sldId id="291" r:id="rId27"/>
-    <p:sldId id="292" r:id="rId28"/>
-    <p:sldId id="293" r:id="rId29"/>
-    <p:sldId id="264" r:id="rId30"/>
-    <p:sldId id="294" r:id="rId31"/>
-    <p:sldId id="295" r:id="rId32"/>
+    <p:sldId id="296" r:id="rId28"/>
+    <p:sldId id="292" r:id="rId29"/>
+    <p:sldId id="293" r:id="rId30"/>
+    <p:sldId id="264" r:id="rId31"/>
+    <p:sldId id="294" r:id="rId32"/>
+    <p:sldId id="295" r:id="rId33"/>
   </p:sldIdLst>
   <p:sldSz cx="12192000" cy="6858000"/>
   <p:notesSz cx="6858000" cy="9144000"/>
@@ -227,7 +228,7 @@
           <a:p>
             <a:fld id="{EF742B50-BE91-D44C-8FE2-0DCD7F9A1E98}" type="datetimeFigureOut">
               <a:rPr lang="en-US" smtClean="0"/>
-              <a:t>11/28/18</a:t>
+              <a:t>11/29/18</a:t>
             </a:fld>
             <a:endParaRPr lang="en-US"/>
           </a:p>
@@ -858,6 +859,90 @@
 </p:notes>
 </file>
 
+<file path=ppt/notesSlides/notesSlide5.xml><?xml version="1.0" encoding="utf-8"?>
+<p:notes xmlns:a="http://schemas.openxmlformats.org/drawingml/2006/main" xmlns:r="http://schemas.openxmlformats.org/officeDocument/2006/relationships" xmlns:p="http://schemas.openxmlformats.org/presentationml/2006/main">
+  <p:cSld>
+    <p:spTree>
+      <p:nvGrpSpPr>
+        <p:cNvPr id="1" name=""/>
+        <p:cNvGrpSpPr/>
+        <p:nvPr/>
+      </p:nvGrpSpPr>
+      <p:grpSpPr>
+        <a:xfrm>
+          <a:off x="0" y="0"/>
+          <a:ext cx="0" cy="0"/>
+          <a:chOff x="0" y="0"/>
+          <a:chExt cx="0" cy="0"/>
+        </a:xfrm>
+      </p:grpSpPr>
+      <p:sp>
+        <p:nvSpPr>
+          <p:cNvPr id="2" name="Slide Image Placeholder 1"/>
+          <p:cNvSpPr>
+            <a:spLocks noGrp="1" noRot="1" noChangeAspect="1"/>
+          </p:cNvSpPr>
+          <p:nvPr>
+            <p:ph type="sldImg"/>
+          </p:nvPr>
+        </p:nvSpPr>
+        <p:spPr/>
+      </p:sp>
+      <p:sp>
+        <p:nvSpPr>
+          <p:cNvPr id="3" name="Notes Placeholder 2"/>
+          <p:cNvSpPr>
+            <a:spLocks noGrp="1"/>
+          </p:cNvSpPr>
+          <p:nvPr>
+            <p:ph type="body" idx="1"/>
+          </p:nvPr>
+        </p:nvSpPr>
+        <p:spPr/>
+        <p:txBody>
+          <a:bodyPr/>
+          <a:lstStyle/>
+          <a:p>
+            <a:endParaRPr lang="en-US" dirty="0"/>
+          </a:p>
+        </p:txBody>
+      </p:sp>
+      <p:sp>
+        <p:nvSpPr>
+          <p:cNvPr id="4" name="Slide Number Placeholder 3"/>
+          <p:cNvSpPr>
+            <a:spLocks noGrp="1"/>
+          </p:cNvSpPr>
+          <p:nvPr>
+            <p:ph type="sldNum" sz="quarter" idx="5"/>
+          </p:nvPr>
+        </p:nvSpPr>
+        <p:spPr/>
+        <p:txBody>
+          <a:bodyPr/>
+          <a:lstStyle/>
+          <a:p>
+            <a:fld id="{5A842E60-C696-C947-9E7E-A51300C3AD0F}" type="slidenum">
+              <a:rPr lang="en-US" smtClean="0"/>
+              <a:t>27</a:t>
+            </a:fld>
+            <a:endParaRPr lang="en-US"/>
+          </a:p>
+        </p:txBody>
+      </p:sp>
+    </p:spTree>
+    <p:extLst>
+      <p:ext uri="{BB962C8B-B14F-4D97-AF65-F5344CB8AC3E}">
+        <p14:creationId xmlns:p14="http://schemas.microsoft.com/office/powerpoint/2010/main" val="1577415464"/>
+      </p:ext>
+    </p:extLst>
+  </p:cSld>
+  <p:clrMapOvr>
+    <a:masterClrMapping/>
+  </p:clrMapOvr>
+</p:notes>
+</file>
+
 <file path=ppt/slideLayouts/slideLayout1.xml><?xml version="1.0" encoding="utf-8"?>
 <p:sldLayout xmlns:a="http://schemas.openxmlformats.org/drawingml/2006/main" xmlns:r="http://schemas.openxmlformats.org/officeDocument/2006/relationships" xmlns:p="http://schemas.openxmlformats.org/presentationml/2006/main" type="title" preserve="1">
   <p:cSld name="Title Slide">
@@ -1005,7 +1090,7 @@
           <a:p>
             <a:fld id="{116686FA-4057-914F-A846-FEDBFF09B299}" type="datetimeFigureOut">
               <a:rPr lang="en-US" smtClean="0"/>
-              <a:t>11/28/18</a:t>
+              <a:t>11/29/18</a:t>
             </a:fld>
             <a:endParaRPr lang="en-US"/>
           </a:p>
@@ -1203,7 +1288,7 @@
           <a:p>
             <a:fld id="{116686FA-4057-914F-A846-FEDBFF09B299}" type="datetimeFigureOut">
               <a:rPr lang="en-US" smtClean="0"/>
-              <a:t>11/28/18</a:t>
+              <a:t>11/29/18</a:t>
             </a:fld>
             <a:endParaRPr lang="en-US"/>
           </a:p>
@@ -1411,7 +1496,7 @@
           <a:p>
             <a:fld id="{116686FA-4057-914F-A846-FEDBFF09B299}" type="datetimeFigureOut">
               <a:rPr lang="en-US" smtClean="0"/>
-              <a:t>11/28/18</a:t>
+              <a:t>11/29/18</a:t>
             </a:fld>
             <a:endParaRPr lang="en-US"/>
           </a:p>
@@ -1609,7 +1694,7 @@
           <a:p>
             <a:fld id="{116686FA-4057-914F-A846-FEDBFF09B299}" type="datetimeFigureOut">
               <a:rPr lang="en-US" smtClean="0"/>
-              <a:t>11/28/18</a:t>
+              <a:t>11/29/18</a:t>
             </a:fld>
             <a:endParaRPr lang="en-US"/>
           </a:p>
@@ -1884,7 +1969,7 @@
           <a:p>
             <a:fld id="{116686FA-4057-914F-A846-FEDBFF09B299}" type="datetimeFigureOut">
               <a:rPr lang="en-US" smtClean="0"/>
-              <a:t>11/28/18</a:t>
+              <a:t>11/29/18</a:t>
             </a:fld>
             <a:endParaRPr lang="en-US"/>
           </a:p>
@@ -2149,7 +2234,7 @@
           <a:p>
             <a:fld id="{116686FA-4057-914F-A846-FEDBFF09B299}" type="datetimeFigureOut">
               <a:rPr lang="en-US" smtClean="0"/>
-              <a:t>11/28/18</a:t>
+              <a:t>11/29/18</a:t>
             </a:fld>
             <a:endParaRPr lang="en-US"/>
           </a:p>
@@ -2561,7 +2646,7 @@
           <a:p>
             <a:fld id="{116686FA-4057-914F-A846-FEDBFF09B299}" type="datetimeFigureOut">
               <a:rPr lang="en-US" smtClean="0"/>
-              <a:t>11/28/18</a:t>
+              <a:t>11/29/18</a:t>
             </a:fld>
             <a:endParaRPr lang="en-US"/>
           </a:p>
@@ -2702,7 +2787,7 @@
           <a:p>
             <a:fld id="{116686FA-4057-914F-A846-FEDBFF09B299}" type="datetimeFigureOut">
               <a:rPr lang="en-US" smtClean="0"/>
-              <a:t>11/28/18</a:t>
+              <a:t>11/29/18</a:t>
             </a:fld>
             <a:endParaRPr lang="en-US"/>
           </a:p>
@@ -2815,7 +2900,7 @@
           <a:p>
             <a:fld id="{116686FA-4057-914F-A846-FEDBFF09B299}" type="datetimeFigureOut">
               <a:rPr lang="en-US" smtClean="0"/>
-              <a:t>11/28/18</a:t>
+              <a:t>11/29/18</a:t>
             </a:fld>
             <a:endParaRPr lang="en-US"/>
           </a:p>
@@ -3126,7 +3211,7 @@
           <a:p>
             <a:fld id="{116686FA-4057-914F-A846-FEDBFF09B299}" type="datetimeFigureOut">
               <a:rPr lang="en-US" smtClean="0"/>
-              <a:t>11/28/18</a:t>
+              <a:t>11/29/18</a:t>
             </a:fld>
             <a:endParaRPr lang="en-US"/>
           </a:p>
@@ -3414,7 +3499,7 @@
           <a:p>
             <a:fld id="{116686FA-4057-914F-A846-FEDBFF09B299}" type="datetimeFigureOut">
               <a:rPr lang="en-US" smtClean="0"/>
-              <a:t>11/28/18</a:t>
+              <a:t>11/29/18</a:t>
             </a:fld>
             <a:endParaRPr lang="en-US"/>
           </a:p>
@@ -3655,7 +3740,7 @@
           <a:p>
             <a:fld id="{116686FA-4057-914F-A846-FEDBFF09B299}" type="datetimeFigureOut">
               <a:rPr lang="en-US" smtClean="0"/>
-              <a:t>11/28/18</a:t>
+              <a:t>11/29/18</a:t>
             </a:fld>
             <a:endParaRPr lang="en-US"/>
           </a:p>
@@ -7401,7 +7486,7 @@
             <p:ph sz="half" idx="2"/>
             <p:extLst>
               <p:ext uri="{D42A27DB-BD31-4B8C-83A1-F6EECF244321}">
-                <p14:modId xmlns:p14="http://schemas.microsoft.com/office/powerpoint/2010/main" val="999418037"/>
+                <p14:modId xmlns:p14="http://schemas.microsoft.com/office/powerpoint/2010/main" val="2191108086"/>
               </p:ext>
             </p:extLst>
           </p:nvPr>
@@ -7627,7 +7712,31 @@
                           <a:ea typeface="+mn-ea"/>
                           <a:cs typeface="+mn-cs"/>
                         </a:rPr>
-                        <a:t>4 - 0 stolen</a:t>
+                        <a:t>4 </a:t>
+                      </a:r>
+                      <a:r>
+                        <a:rPr lang="en-US" sz="1800" b="0" i="0" kern="1200">
+                          <a:solidFill>
+                            <a:schemeClr val="dk1"/>
+                          </a:solidFill>
+                          <a:effectLst/>
+                          <a:latin typeface="+mn-lt"/>
+                          <a:ea typeface="+mn-ea"/>
+                          <a:cs typeface="+mn-cs"/>
+                        </a:rPr>
+                        <a:t>- 9 </a:t>
+                      </a:r>
+                      <a:r>
+                        <a:rPr lang="en-US" sz="1800" b="0" i="0" kern="1200" dirty="0">
+                          <a:solidFill>
+                            <a:schemeClr val="dk1"/>
+                          </a:solidFill>
+                          <a:effectLst/>
+                          <a:latin typeface="+mn-lt"/>
+                          <a:ea typeface="+mn-ea"/>
+                          <a:cs typeface="+mn-cs"/>
+                        </a:rPr>
+                        <a:t>stolen</a:t>
                       </a:r>
                     </a:p>
                   </a:txBody>
@@ -8158,6 +8267,452 @@
           <p:cNvPr id="2" name="Title 1">
             <a:extLst>
               <a:ext uri="{FF2B5EF4-FFF2-40B4-BE49-F238E27FC236}">
+                <a16:creationId xmlns:a16="http://schemas.microsoft.com/office/drawing/2014/main" id="{7D12B4BD-E114-C648-8714-7DE279A4A106}"/>
+              </a:ext>
+            </a:extLst>
+          </p:cNvPr>
+          <p:cNvSpPr>
+            <a:spLocks noGrp="1"/>
+          </p:cNvSpPr>
+          <p:nvPr>
+            <p:ph type="title"/>
+          </p:nvPr>
+        </p:nvSpPr>
+        <p:spPr/>
+        <p:txBody>
+          <a:bodyPr/>
+          <a:lstStyle/>
+          <a:p>
+            <a:r>
+              <a:rPr lang="en-US" dirty="0"/>
+              <a:t>Random Forest Classifier</a:t>
+            </a:r>
+          </a:p>
+        </p:txBody>
+      </p:sp>
+      <p:sp>
+        <p:nvSpPr>
+          <p:cNvPr id="5" name="Text Placeholder 4">
+            <a:extLst>
+              <a:ext uri="{FF2B5EF4-FFF2-40B4-BE49-F238E27FC236}">
+                <a16:creationId xmlns:a16="http://schemas.microsoft.com/office/drawing/2014/main" id="{A6695063-E8AC-3747-9964-D19E6C32DE12}"/>
+              </a:ext>
+            </a:extLst>
+          </p:cNvPr>
+          <p:cNvSpPr>
+            <a:spLocks noGrp="1"/>
+          </p:cNvSpPr>
+          <p:nvPr>
+            <p:ph type="body" idx="1"/>
+          </p:nvPr>
+        </p:nvSpPr>
+        <p:spPr/>
+        <p:txBody>
+          <a:bodyPr/>
+          <a:lstStyle/>
+          <a:p>
+            <a:r>
+              <a:rPr lang="en-US" dirty="0"/>
+              <a:t>Model Score</a:t>
+            </a:r>
+          </a:p>
+        </p:txBody>
+      </p:sp>
+      <p:graphicFrame>
+        <p:nvGraphicFramePr>
+          <p:cNvPr id="13" name="Content Placeholder 12">
+            <a:extLst>
+              <a:ext uri="{FF2B5EF4-FFF2-40B4-BE49-F238E27FC236}">
+                <a16:creationId xmlns:a16="http://schemas.microsoft.com/office/drawing/2014/main" id="{EA5FC206-9BA8-6B45-B3BE-64F5116DF2D9}"/>
+              </a:ext>
+            </a:extLst>
+          </p:cNvPr>
+          <p:cNvGraphicFramePr>
+            <a:graphicFrameLocks noGrp="1"/>
+          </p:cNvGraphicFramePr>
+          <p:nvPr>
+            <p:ph sz="half" idx="2"/>
+            <p:extLst/>
+          </p:nvPr>
+        </p:nvGraphicFramePr>
+        <p:xfrm>
+          <a:off x="839788" y="2505075"/>
+          <a:ext cx="5157788" cy="2560320"/>
+        </p:xfrm>
+        <a:graphic>
+          <a:graphicData uri="http://schemas.openxmlformats.org/drawingml/2006/table">
+            <a:tbl>
+              <a:tblPr firstRow="1" bandRow="1">
+                <a:tableStyleId>{0505E3EF-67EA-436B-97B2-0124C06EBD24}</a:tableStyleId>
+              </a:tblPr>
+              <a:tblGrid>
+                <a:gridCol w="2578894">
+                  <a:extLst>
+                    <a:ext uri="{9D8B030D-6E8A-4147-A177-3AD203B41FA5}">
+                      <a16:colId xmlns:a16="http://schemas.microsoft.com/office/drawing/2014/main" val="4136039584"/>
+                    </a:ext>
+                  </a:extLst>
+                </a:gridCol>
+                <a:gridCol w="2578894">
+                  <a:extLst>
+                    <a:ext uri="{9D8B030D-6E8A-4147-A177-3AD203B41FA5}">
+                      <a16:colId xmlns:a16="http://schemas.microsoft.com/office/drawing/2014/main" val="915918369"/>
+                    </a:ext>
+                  </a:extLst>
+                </a:gridCol>
+              </a:tblGrid>
+              <a:tr h="370840">
+                <a:tc>
+                  <a:txBody>
+                    <a:bodyPr/>
+                    <a:lstStyle/>
+                    <a:p>
+                      <a:r>
+                        <a:rPr lang="en-US"/>
+                        <a:t>Variance</a:t>
+                      </a:r>
+                      <a:endParaRPr lang="en-US" dirty="0"/>
+                    </a:p>
+                  </a:txBody>
+                  <a:tcPr/>
+                </a:tc>
+                <a:tc>
+                  <a:txBody>
+                    <a:bodyPr/>
+                    <a:lstStyle/>
+                    <a:p>
+                      <a:r>
+                        <a:rPr lang="en-US"/>
+                        <a:t>Mean: 12.05 </a:t>
+                      </a:r>
+                    </a:p>
+                    <a:p>
+                      <a:r>
+                        <a:rPr lang="en-US"/>
+                        <a:t>STD: 31.87</a:t>
+                      </a:r>
+                      <a:endParaRPr lang="en-US" dirty="0"/>
+                    </a:p>
+                  </a:txBody>
+                  <a:tcPr/>
+                </a:tc>
+                <a:extLst>
+                  <a:ext uri="{0D108BD9-81ED-4DB2-BD59-A6C34878D82A}">
+                    <a16:rowId xmlns:a16="http://schemas.microsoft.com/office/drawing/2014/main" val="4107641731"/>
+                  </a:ext>
+                </a:extLst>
+              </a:tr>
+              <a:tr h="370840">
+                <a:tc>
+                  <a:txBody>
+                    <a:bodyPr/>
+                    <a:lstStyle/>
+                    <a:p>
+                      <a:r>
+                        <a:rPr lang="en-US"/>
+                        <a:t>Random Forest Train Score:</a:t>
+                      </a:r>
+                      <a:endParaRPr lang="en-US" dirty="0"/>
+                    </a:p>
+                  </a:txBody>
+                  <a:tcPr/>
+                </a:tc>
+                <a:tc>
+                  <a:txBody>
+                    <a:bodyPr/>
+                    <a:lstStyle/>
+                    <a:p>
+                      <a:r>
+                        <a:rPr lang="en-US"/>
+                        <a:t>1.0</a:t>
+                      </a:r>
+                      <a:endParaRPr lang="en-US" dirty="0"/>
+                    </a:p>
+                  </a:txBody>
+                  <a:tcPr/>
+                </a:tc>
+                <a:extLst>
+                  <a:ext uri="{0D108BD9-81ED-4DB2-BD59-A6C34878D82A}">
+                    <a16:rowId xmlns:a16="http://schemas.microsoft.com/office/drawing/2014/main" val="2040173912"/>
+                  </a:ext>
+                </a:extLst>
+              </a:tr>
+              <a:tr h="370840">
+                <a:tc>
+                  <a:txBody>
+                    <a:bodyPr/>
+                    <a:lstStyle/>
+                    <a:p>
+                      <a:r>
+                        <a:rPr lang="en-US"/>
+                        <a:t>Random Forest Validation Score</a:t>
+                      </a:r>
+                      <a:endParaRPr lang="en-US" dirty="0"/>
+                    </a:p>
+                  </a:txBody>
+                  <a:tcPr/>
+                </a:tc>
+                <a:tc>
+                  <a:txBody>
+                    <a:bodyPr/>
+                    <a:lstStyle/>
+                    <a:p>
+                      <a:r>
+                        <a:rPr lang="en-US" dirty="0"/>
+                        <a:t>0.6184971098265896</a:t>
+                      </a:r>
+                    </a:p>
+                  </a:txBody>
+                  <a:tcPr/>
+                </a:tc>
+                <a:extLst>
+                  <a:ext uri="{0D108BD9-81ED-4DB2-BD59-A6C34878D82A}">
+                    <a16:rowId xmlns:a16="http://schemas.microsoft.com/office/drawing/2014/main" val="2852505692"/>
+                  </a:ext>
+                </a:extLst>
+              </a:tr>
+              <a:tr h="370840">
+                <a:tc>
+                  <a:txBody>
+                    <a:bodyPr/>
+                    <a:lstStyle/>
+                    <a:p>
+                      <a:r>
+                        <a:rPr lang="en-US"/>
+                        <a:t>Random Forest Train-Validation MAE:</a:t>
+                      </a:r>
+                      <a:endParaRPr lang="en-US" dirty="0"/>
+                    </a:p>
+                  </a:txBody>
+                  <a:tcPr/>
+                </a:tc>
+                <a:tc>
+                  <a:txBody>
+                    <a:bodyPr/>
+                    <a:lstStyle/>
+                    <a:p>
+                      <a:r>
+                        <a:rPr lang="en-US" dirty="0"/>
+                        <a:t>0.5722543352601156</a:t>
+                      </a:r>
+                    </a:p>
+                  </a:txBody>
+                  <a:tcPr/>
+                </a:tc>
+                <a:extLst>
+                  <a:ext uri="{0D108BD9-81ED-4DB2-BD59-A6C34878D82A}">
+                    <a16:rowId xmlns:a16="http://schemas.microsoft.com/office/drawing/2014/main" val="3336016788"/>
+                  </a:ext>
+                </a:extLst>
+              </a:tr>
+            </a:tbl>
+          </a:graphicData>
+        </a:graphic>
+      </p:graphicFrame>
+      <p:sp>
+        <p:nvSpPr>
+          <p:cNvPr id="7" name="Text Placeholder 6">
+            <a:extLst>
+              <a:ext uri="{FF2B5EF4-FFF2-40B4-BE49-F238E27FC236}">
+                <a16:creationId xmlns:a16="http://schemas.microsoft.com/office/drawing/2014/main" id="{046A189B-3C41-E24E-8974-B32537351590}"/>
+              </a:ext>
+            </a:extLst>
+          </p:cNvPr>
+          <p:cNvSpPr>
+            <a:spLocks noGrp="1"/>
+          </p:cNvSpPr>
+          <p:nvPr>
+            <p:ph type="body" sz="quarter" idx="3"/>
+          </p:nvPr>
+        </p:nvSpPr>
+        <p:spPr/>
+        <p:txBody>
+          <a:bodyPr/>
+          <a:lstStyle/>
+          <a:p>
+            <a:r>
+              <a:rPr lang="en-US" dirty="0"/>
+              <a:t>Roc </a:t>
+            </a:r>
+            <a:r>
+              <a:rPr lang="en-US" dirty="0" err="1"/>
+              <a:t>Auc</a:t>
+            </a:r>
+            <a:r>
+              <a:rPr lang="en-US" dirty="0"/>
+              <a:t> Scores</a:t>
+            </a:r>
+          </a:p>
+        </p:txBody>
+      </p:sp>
+      <p:pic>
+        <p:nvPicPr>
+          <p:cNvPr id="8" name="Content Placeholder 7">
+            <a:extLst>
+              <a:ext uri="{FF2B5EF4-FFF2-40B4-BE49-F238E27FC236}">
+                <a16:creationId xmlns:a16="http://schemas.microsoft.com/office/drawing/2014/main" id="{F9D95944-D7FE-B14B-B335-19215B295EE2}"/>
+              </a:ext>
+            </a:extLst>
+          </p:cNvPr>
+          <p:cNvPicPr>
+            <a:picLocks noGrp="1" noChangeAspect="1"/>
+          </p:cNvPicPr>
+          <p:nvPr>
+            <p:ph sz="quarter" idx="4"/>
+          </p:nvPr>
+        </p:nvPicPr>
+        <p:blipFill>
+          <a:blip r:embed="rId3"/>
+          <a:stretch>
+            <a:fillRect/>
+          </a:stretch>
+        </p:blipFill>
+        <p:spPr>
+          <a:xfrm>
+            <a:off x="6172200" y="2963289"/>
+            <a:ext cx="5183188" cy="1715647"/>
+          </a:xfrm>
+        </p:spPr>
+      </p:pic>
+      <p:sp>
+        <p:nvSpPr>
+          <p:cNvPr id="3" name="Donut 2">
+            <a:extLst>
+              <a:ext uri="{FF2B5EF4-FFF2-40B4-BE49-F238E27FC236}">
+                <a16:creationId xmlns:a16="http://schemas.microsoft.com/office/drawing/2014/main" id="{902F55C6-D6A6-8A41-8081-A14C2D6D0F43}"/>
+              </a:ext>
+            </a:extLst>
+          </p:cNvPr>
+          <p:cNvSpPr/>
+          <p:nvPr/>
+        </p:nvSpPr>
+        <p:spPr>
+          <a:xfrm>
+            <a:off x="7646125" y="3378925"/>
+            <a:ext cx="836024" cy="243840"/>
+          </a:xfrm>
+          <a:prstGeom prst="donut">
+            <a:avLst>
+              <a:gd name="adj" fmla="val 6553"/>
+            </a:avLst>
+          </a:prstGeom>
+        </p:spPr>
+        <p:style>
+          <a:lnRef idx="2">
+            <a:schemeClr val="accent1">
+              <a:shade val="50000"/>
+            </a:schemeClr>
+          </a:lnRef>
+          <a:fillRef idx="1">
+            <a:schemeClr val="accent1"/>
+          </a:fillRef>
+          <a:effectRef idx="0">
+            <a:schemeClr val="accent1"/>
+          </a:effectRef>
+          <a:fontRef idx="minor">
+            <a:schemeClr val="lt1"/>
+          </a:fontRef>
+        </p:style>
+        <p:txBody>
+          <a:bodyPr rtlCol="0" anchor="ctr"/>
+          <a:lstStyle/>
+          <a:p>
+            <a:pPr algn="ctr"/>
+            <a:endParaRPr lang="en-US">
+              <a:solidFill>
+                <a:schemeClr val="tx1"/>
+              </a:solidFill>
+            </a:endParaRPr>
+          </a:p>
+        </p:txBody>
+      </p:sp>
+      <p:sp>
+        <p:nvSpPr>
+          <p:cNvPr id="9" name="Donut 8">
+            <a:extLst>
+              <a:ext uri="{FF2B5EF4-FFF2-40B4-BE49-F238E27FC236}">
+                <a16:creationId xmlns:a16="http://schemas.microsoft.com/office/drawing/2014/main" id="{51E7E61A-47C7-984C-88A0-86BE35A2B434}"/>
+              </a:ext>
+            </a:extLst>
+          </p:cNvPr>
+          <p:cNvSpPr/>
+          <p:nvPr/>
+        </p:nvSpPr>
+        <p:spPr>
+          <a:xfrm>
+            <a:off x="7646125" y="3907010"/>
+            <a:ext cx="836024" cy="243840"/>
+          </a:xfrm>
+          <a:prstGeom prst="donut">
+            <a:avLst>
+              <a:gd name="adj" fmla="val 6553"/>
+            </a:avLst>
+          </a:prstGeom>
+        </p:spPr>
+        <p:style>
+          <a:lnRef idx="2">
+            <a:schemeClr val="accent1">
+              <a:shade val="50000"/>
+            </a:schemeClr>
+          </a:lnRef>
+          <a:fillRef idx="1">
+            <a:schemeClr val="accent1"/>
+          </a:fillRef>
+          <a:effectRef idx="0">
+            <a:schemeClr val="accent1"/>
+          </a:effectRef>
+          <a:fontRef idx="minor">
+            <a:schemeClr val="lt1"/>
+          </a:fontRef>
+        </p:style>
+        <p:txBody>
+          <a:bodyPr rtlCol="0" anchor="ctr"/>
+          <a:lstStyle/>
+          <a:p>
+            <a:pPr algn="ctr"/>
+            <a:endParaRPr lang="en-US">
+              <a:solidFill>
+                <a:schemeClr val="tx1"/>
+              </a:solidFill>
+            </a:endParaRPr>
+          </a:p>
+        </p:txBody>
+      </p:sp>
+    </p:spTree>
+    <p:extLst>
+      <p:ext uri="{BB962C8B-B14F-4D97-AF65-F5344CB8AC3E}">
+        <p14:creationId xmlns:p14="http://schemas.microsoft.com/office/powerpoint/2010/main" val="1997974050"/>
+      </p:ext>
+    </p:extLst>
+  </p:cSld>
+  <p:clrMapOvr>
+    <a:masterClrMapping/>
+  </p:clrMapOvr>
+</p:sld>
+</file>
+
+<file path=ppt/slides/slide28.xml><?xml version="1.0" encoding="utf-8"?>
+<p:sld xmlns:a="http://schemas.openxmlformats.org/drawingml/2006/main" xmlns:r="http://schemas.openxmlformats.org/officeDocument/2006/relationships" xmlns:p="http://schemas.openxmlformats.org/presentationml/2006/main">
+  <p:cSld>
+    <p:spTree>
+      <p:nvGrpSpPr>
+        <p:cNvPr id="1" name=""/>
+        <p:cNvGrpSpPr/>
+        <p:nvPr/>
+      </p:nvGrpSpPr>
+      <p:grpSpPr>
+        <a:xfrm>
+          <a:off x="0" y="0"/>
+          <a:ext cx="0" cy="0"/>
+          <a:chOff x="0" y="0"/>
+          <a:chExt cx="0" cy="0"/>
+        </a:xfrm>
+      </p:grpSpPr>
+      <p:sp>
+        <p:nvSpPr>
+          <p:cNvPr id="2" name="Title 1">
+            <a:extLst>
+              <a:ext uri="{FF2B5EF4-FFF2-40B4-BE49-F238E27FC236}">
                 <a16:creationId xmlns:a16="http://schemas.microsoft.com/office/drawing/2014/main" id="{2B19FDD2-55B6-A849-9BA6-1E6CBEBA0599}"/>
               </a:ext>
             </a:extLst>
@@ -8224,152 +8779,6 @@
 </p:sld>
 </file>
 
-<file path=ppt/slides/slide28.xml><?xml version="1.0" encoding="utf-8"?>
-<p:sld xmlns:a="http://schemas.openxmlformats.org/drawingml/2006/main" xmlns:r="http://schemas.openxmlformats.org/officeDocument/2006/relationships" xmlns:p="http://schemas.openxmlformats.org/presentationml/2006/main">
-  <p:cSld>
-    <p:spTree>
-      <p:nvGrpSpPr>
-        <p:cNvPr id="1" name=""/>
-        <p:cNvGrpSpPr/>
-        <p:nvPr/>
-      </p:nvGrpSpPr>
-      <p:grpSpPr>
-        <a:xfrm>
-          <a:off x="0" y="0"/>
-          <a:ext cx="0" cy="0"/>
-          <a:chOff x="0" y="0"/>
-          <a:chExt cx="0" cy="0"/>
-        </a:xfrm>
-      </p:grpSpPr>
-      <p:sp>
-        <p:nvSpPr>
-          <p:cNvPr id="2" name="Title 1">
-            <a:extLst>
-              <a:ext uri="{FF2B5EF4-FFF2-40B4-BE49-F238E27FC236}">
-                <a16:creationId xmlns:a16="http://schemas.microsoft.com/office/drawing/2014/main" id="{C2EF45AE-AE5B-C046-8088-193EE0B20B70}"/>
-              </a:ext>
-            </a:extLst>
-          </p:cNvPr>
-          <p:cNvSpPr>
-            <a:spLocks noGrp="1"/>
-          </p:cNvSpPr>
-          <p:nvPr>
-            <p:ph type="title"/>
-          </p:nvPr>
-        </p:nvSpPr>
-        <p:spPr/>
-        <p:txBody>
-          <a:bodyPr/>
-          <a:lstStyle/>
-          <a:p>
-            <a:r>
-              <a:rPr lang="en-US" dirty="0"/>
-              <a:t>Next Steps</a:t>
-            </a:r>
-          </a:p>
-        </p:txBody>
-      </p:sp>
-      <p:sp>
-        <p:nvSpPr>
-          <p:cNvPr id="3" name="Content Placeholder 2">
-            <a:extLst>
-              <a:ext uri="{FF2B5EF4-FFF2-40B4-BE49-F238E27FC236}">
-                <a16:creationId xmlns:a16="http://schemas.microsoft.com/office/drawing/2014/main" id="{0A12FBDA-2525-9F4B-930A-9F48ADED9DCC}"/>
-              </a:ext>
-            </a:extLst>
-          </p:cNvPr>
-          <p:cNvSpPr>
-            <a:spLocks noGrp="1"/>
-          </p:cNvSpPr>
-          <p:nvPr>
-            <p:ph idx="1"/>
-          </p:nvPr>
-        </p:nvSpPr>
-        <p:spPr/>
-        <p:txBody>
-          <a:bodyPr>
-            <a:normAutofit/>
-          </a:bodyPr>
-          <a:lstStyle/>
-          <a:p>
-            <a:r>
-              <a:rPr lang="en-US" dirty="0"/>
-              <a:t>Extreme scenarios – </a:t>
-            </a:r>
-          </a:p>
-          <a:p>
-            <a:pPr lvl="1"/>
-            <a:r>
-              <a:rPr lang="en-US" dirty="0"/>
-              <a:t>High theft (bin 4 - 475+ thefts) </a:t>
-            </a:r>
-          </a:p>
-          <a:p>
-            <a:pPr lvl="1"/>
-            <a:r>
-              <a:rPr lang="en-US" dirty="0"/>
-              <a:t>Low theft (bin 1 - 1 theft.)</a:t>
-            </a:r>
-          </a:p>
-          <a:p>
-            <a:r>
-              <a:rPr lang="en-US" dirty="0"/>
-              <a:t>Outliers!!</a:t>
-            </a:r>
-          </a:p>
-          <a:p>
-            <a:r>
-              <a:rPr lang="en-US" dirty="0"/>
-              <a:t>How do I deal with these outliers?</a:t>
-            </a:r>
-          </a:p>
-          <a:p>
-            <a:pPr lvl="1"/>
-            <a:r>
-              <a:rPr lang="en-US" dirty="0"/>
-              <a:t>Classify </a:t>
-            </a:r>
-            <a:r>
-              <a:rPr lang="en-US" dirty="0" err="1"/>
-              <a:t>zipcodes</a:t>
-            </a:r>
-            <a:r>
-              <a:rPr lang="en-US" dirty="0"/>
-              <a:t> with high theft versus low theft more clearly and predict within these two classifiers</a:t>
-            </a:r>
-          </a:p>
-          <a:p>
-            <a:pPr lvl="1"/>
-            <a:r>
-              <a:rPr lang="en-US" dirty="0"/>
-              <a:t>Predict number of stolen bikes in High Theft areas</a:t>
-            </a:r>
-          </a:p>
-          <a:p>
-            <a:pPr lvl="1"/>
-            <a:r>
-              <a:rPr lang="en-US" dirty="0"/>
-              <a:t>Predict number of stolen bikes in Low Theft areas</a:t>
-            </a:r>
-          </a:p>
-          <a:p>
-            <a:endParaRPr lang="en-US" dirty="0"/>
-          </a:p>
-        </p:txBody>
-      </p:sp>
-    </p:spTree>
-    <p:extLst>
-      <p:ext uri="{BB962C8B-B14F-4D97-AF65-F5344CB8AC3E}">
-        <p14:creationId xmlns:p14="http://schemas.microsoft.com/office/powerpoint/2010/main" val="164793588"/>
-      </p:ext>
-    </p:extLst>
-  </p:cSld>
-  <p:clrMapOvr>
-    <a:masterClrMapping/>
-  </p:clrMapOvr>
-</p:sld>
-</file>
-
 <file path=ppt/slides/slide29.xml><?xml version="1.0" encoding="utf-8"?>
 <p:sld xmlns:a="http://schemas.openxmlformats.org/drawingml/2006/main" xmlns:r="http://schemas.openxmlformats.org/officeDocument/2006/relationships" xmlns:p="http://schemas.openxmlformats.org/presentationml/2006/main">
   <p:cSld>
@@ -8392,7 +8801,7 @@
           <p:cNvPr id="2" name="Title 1">
             <a:extLst>
               <a:ext uri="{FF2B5EF4-FFF2-40B4-BE49-F238E27FC236}">
-                <a16:creationId xmlns:a16="http://schemas.microsoft.com/office/drawing/2014/main" id="{D11D160D-3FEB-1B4C-BAEE-D79ABCFB9E6F}"/>
+                <a16:creationId xmlns:a16="http://schemas.microsoft.com/office/drawing/2014/main" id="{C2EF45AE-AE5B-C046-8088-193EE0B20B70}"/>
               </a:ext>
             </a:extLst>
           </p:cNvPr>
@@ -8409,8 +8818,8 @@
           <a:lstStyle/>
           <a:p>
             <a:r>
-              <a:rPr lang="en-US" b="1" dirty="0"/>
-              <a:t>What I learned</a:t>
+              <a:rPr lang="en-US" dirty="0"/>
+              <a:t>Next Steps</a:t>
             </a:r>
           </a:p>
         </p:txBody>
@@ -8420,7 +8829,7 @@
           <p:cNvPr id="3" name="Content Placeholder 2">
             <a:extLst>
               <a:ext uri="{FF2B5EF4-FFF2-40B4-BE49-F238E27FC236}">
-                <a16:creationId xmlns:a16="http://schemas.microsoft.com/office/drawing/2014/main" id="{305DCC6A-7E17-DE40-B1D0-932C482A17C0}"/>
+                <a16:creationId xmlns:a16="http://schemas.microsoft.com/office/drawing/2014/main" id="{0A12FBDA-2525-9F4B-930A-9F48ADED9DCC}"/>
               </a:ext>
             </a:extLst>
           </p:cNvPr>
@@ -8431,99 +8840,82 @@
             <p:ph idx="1"/>
           </p:nvPr>
         </p:nvSpPr>
-        <p:spPr>
-          <a:xfrm>
-            <a:off x="838200" y="1690688"/>
-            <a:ext cx="10515600" cy="4351338"/>
-          </a:xfrm>
-        </p:spPr>
+        <p:spPr/>
         <p:txBody>
           <a:bodyPr>
-            <a:normAutofit fontScale="92500" lnSpcReduction="20000"/>
+            <a:normAutofit/>
           </a:bodyPr>
           <a:lstStyle/>
           <a:p>
             <a:r>
               <a:rPr lang="en-US" dirty="0"/>
-              <a:t>Git/source control</a:t>
-            </a:r>
-          </a:p>
-          <a:p>
+              <a:t>Extreme scenarios – </a:t>
+            </a:r>
+          </a:p>
+          <a:p>
+            <a:pPr lvl="1"/>
             <a:r>
               <a:rPr lang="en-US" dirty="0"/>
-              <a:t>Python/Libraries</a:t>
-            </a:r>
-          </a:p>
-          <a:p>
+              <a:t>High theft (bin 4 - 475+ thefts) </a:t>
+            </a:r>
+          </a:p>
+          <a:p>
+            <a:pPr lvl="1"/>
             <a:r>
               <a:rPr lang="en-US" dirty="0"/>
-              <a:t>Scrape an API</a:t>
+              <a:t>Low theft (bin 1 - 1 theft.)</a:t>
             </a:r>
           </a:p>
           <a:p>
             <a:r>
               <a:rPr lang="en-US" dirty="0"/>
-              <a:t>Handle API errors</a:t>
+              <a:t>Outliers!!</a:t>
             </a:r>
           </a:p>
           <a:p>
             <a:r>
               <a:rPr lang="en-US" dirty="0"/>
-              <a:t>Use python to do </a:t>
+              <a:t>How do I deal with these outliers?</a:t>
+            </a:r>
+          </a:p>
+          <a:p>
+            <a:pPr lvl="1"/>
+            <a:r>
+              <a:rPr lang="en-US" dirty="0"/>
+              <a:t>Classify </a:t>
             </a:r>
             <a:r>
               <a:rPr lang="en-US" dirty="0" err="1"/>
-              <a:t>maths</a:t>
+              <a:t>zipcodes</a:t>
             </a:r>
             <a:r>
               <a:rPr lang="en-US" dirty="0"/>
-              <a:t>:</a:t>
+              <a:t> with high theft versus low theft more clearly and predict within these two classifiers</a:t>
             </a:r>
           </a:p>
           <a:p>
             <a:pPr lvl="1"/>
             <a:r>
               <a:rPr lang="en-US" dirty="0"/>
-              <a:t>Average Income from Tax Statements</a:t>
+              <a:t>Predict number of stolen bikes in High Theft areas</a:t>
             </a:r>
           </a:p>
           <a:p>
             <a:pPr lvl="1"/>
             <a:r>
               <a:rPr lang="en-US" dirty="0"/>
-              <a:t>Total bikes stolen in time frame</a:t>
-            </a:r>
-          </a:p>
-          <a:p>
-            <a:r>
-              <a:rPr lang="en-US" dirty="0"/>
-              <a:t>Merge DataFrames</a:t>
-            </a:r>
-          </a:p>
-          <a:p>
-            <a:r>
-              <a:rPr lang="en-US" dirty="0"/>
-              <a:t>Random Forests</a:t>
-            </a:r>
-          </a:p>
-          <a:p>
-            <a:r>
-              <a:rPr lang="en-US" dirty="0"/>
-              <a:t>Linear Regression Models</a:t>
-            </a:r>
-          </a:p>
-          <a:p>
-            <a:r>
-              <a:rPr lang="en-US" dirty="0"/>
-              <a:t>When to stop....</a:t>
-            </a:r>
+              <a:t>Predict number of stolen bikes in Low Theft areas</a:t>
+            </a:r>
+          </a:p>
+          <a:p>
+            <a:endParaRPr lang="en-US" dirty="0"/>
           </a:p>
         </p:txBody>
       </p:sp>
     </p:spTree>
     <p:extLst>
       <p:ext uri="{BB962C8B-B14F-4D97-AF65-F5344CB8AC3E}">
-        <p14:creationId xmlns:p14="http://schemas.microsoft.com/office/powerpoint/2010/main" val="303828221"/>
+        <p14:creationId xmlns:p14="http://schemas.microsoft.com/office/powerpoint/2010/main" val="164793588"/>
       </p:ext>
     </p:extLst>
   </p:cSld>
@@ -8801,6 +9193,169 @@
           <p:cNvPr id="2" name="Title 1">
             <a:extLst>
               <a:ext uri="{FF2B5EF4-FFF2-40B4-BE49-F238E27FC236}">
+                <a16:creationId xmlns:a16="http://schemas.microsoft.com/office/drawing/2014/main" id="{D11D160D-3FEB-1B4C-BAEE-D79ABCFB9E6F}"/>
+              </a:ext>
+            </a:extLst>
+          </p:cNvPr>
+          <p:cNvSpPr>
+            <a:spLocks noGrp="1"/>
+          </p:cNvSpPr>
+          <p:nvPr>
+            <p:ph type="title"/>
+          </p:nvPr>
+        </p:nvSpPr>
+        <p:spPr/>
+        <p:txBody>
+          <a:bodyPr/>
+          <a:lstStyle/>
+          <a:p>
+            <a:r>
+              <a:rPr lang="en-US" b="1" dirty="0"/>
+              <a:t>What I learned</a:t>
+            </a:r>
+          </a:p>
+        </p:txBody>
+      </p:sp>
+      <p:sp>
+        <p:nvSpPr>
+          <p:cNvPr id="3" name="Content Placeholder 2">
+            <a:extLst>
+              <a:ext uri="{FF2B5EF4-FFF2-40B4-BE49-F238E27FC236}">
+                <a16:creationId xmlns:a16="http://schemas.microsoft.com/office/drawing/2014/main" id="{305DCC6A-7E17-DE40-B1D0-932C482A17C0}"/>
+              </a:ext>
+            </a:extLst>
+          </p:cNvPr>
+          <p:cNvSpPr>
+            <a:spLocks noGrp="1"/>
+          </p:cNvSpPr>
+          <p:nvPr>
+            <p:ph idx="1"/>
+          </p:nvPr>
+        </p:nvSpPr>
+        <p:spPr>
+          <a:xfrm>
+            <a:off x="838200" y="1690688"/>
+            <a:ext cx="10515600" cy="4351338"/>
+          </a:xfrm>
+        </p:spPr>
+        <p:txBody>
+          <a:bodyPr>
+            <a:normAutofit fontScale="92500" lnSpcReduction="20000"/>
+          </a:bodyPr>
+          <a:lstStyle/>
+          <a:p>
+            <a:r>
+              <a:rPr lang="en-US" dirty="0"/>
+              <a:t>Git/source control</a:t>
+            </a:r>
+          </a:p>
+          <a:p>
+            <a:r>
+              <a:rPr lang="en-US" dirty="0"/>
+              <a:t>Python/Libraries</a:t>
+            </a:r>
+          </a:p>
+          <a:p>
+            <a:r>
+              <a:rPr lang="en-US" dirty="0"/>
+              <a:t>Scrape an API</a:t>
+            </a:r>
+          </a:p>
+          <a:p>
+            <a:r>
+              <a:rPr lang="en-US" dirty="0"/>
+              <a:t>Handle API errors</a:t>
+            </a:r>
+          </a:p>
+          <a:p>
+            <a:r>
+              <a:rPr lang="en-US" dirty="0"/>
+              <a:t>Use python to do </a:t>
+            </a:r>
+            <a:r>
+              <a:rPr lang="en-US" dirty="0" err="1"/>
+              <a:t>maths</a:t>
+            </a:r>
+            <a:r>
+              <a:rPr lang="en-US" dirty="0"/>
+              <a:t>:</a:t>
+            </a:r>
+          </a:p>
+          <a:p>
+            <a:pPr lvl="1"/>
+            <a:r>
+              <a:rPr lang="en-US" dirty="0"/>
+              <a:t>Average Income from Tax Statements</a:t>
+            </a:r>
+          </a:p>
+          <a:p>
+            <a:pPr lvl="1"/>
+            <a:r>
+              <a:rPr lang="en-US" dirty="0"/>
+              <a:t>Total bikes stolen in time frame</a:t>
+            </a:r>
+          </a:p>
+          <a:p>
+            <a:r>
+              <a:rPr lang="en-US" dirty="0"/>
+              <a:t>Merge DataFrames</a:t>
+            </a:r>
+          </a:p>
+          <a:p>
+            <a:r>
+              <a:rPr lang="en-US" dirty="0"/>
+              <a:t>Random Forests</a:t>
+            </a:r>
+          </a:p>
+          <a:p>
+            <a:r>
+              <a:rPr lang="en-US" dirty="0"/>
+              <a:t>Linear Regression Models</a:t>
+            </a:r>
+          </a:p>
+          <a:p>
+            <a:r>
+              <a:rPr lang="en-US" dirty="0"/>
+              <a:t>When to stop....</a:t>
+            </a:r>
+          </a:p>
+        </p:txBody>
+      </p:sp>
+    </p:spTree>
+    <p:extLst>
+      <p:ext uri="{BB962C8B-B14F-4D97-AF65-F5344CB8AC3E}">
+        <p14:creationId xmlns:p14="http://schemas.microsoft.com/office/powerpoint/2010/main" val="303828221"/>
+      </p:ext>
+    </p:extLst>
+  </p:cSld>
+  <p:clrMapOvr>
+    <a:masterClrMapping/>
+  </p:clrMapOvr>
+</p:sld>
+</file>
+
+<file path=ppt/slides/slide31.xml><?xml version="1.0" encoding="utf-8"?>
+<p:sld xmlns:a="http://schemas.openxmlformats.org/drawingml/2006/main" xmlns:r="http://schemas.openxmlformats.org/officeDocument/2006/relationships" xmlns:p="http://schemas.openxmlformats.org/presentationml/2006/main">
+  <p:cSld>
+    <p:spTree>
+      <p:nvGrpSpPr>
+        <p:cNvPr id="1" name=""/>
+        <p:cNvGrpSpPr/>
+        <p:nvPr/>
+      </p:nvGrpSpPr>
+      <p:grpSpPr>
+        <a:xfrm>
+          <a:off x="0" y="0"/>
+          <a:ext cx="0" cy="0"/>
+          <a:chOff x="0" y="0"/>
+          <a:chExt cx="0" cy="0"/>
+        </a:xfrm>
+      </p:grpSpPr>
+      <p:sp>
+        <p:nvSpPr>
+          <p:cNvPr id="2" name="Title 1">
+            <a:extLst>
+              <a:ext uri="{FF2B5EF4-FFF2-40B4-BE49-F238E27FC236}">
                 <a16:creationId xmlns:a16="http://schemas.microsoft.com/office/drawing/2014/main" id="{A1D0D06E-C804-F543-AC5D-6B59611324EC}"/>
               </a:ext>
             </a:extLst>
@@ -8857,7 +9412,7 @@
 </p:sld>
 </file>
 
-<file path=ppt/slides/slide31.xml><?xml version="1.0" encoding="utf-8"?>
+<file path=ppt/slides/slide32.xml><?xml version="1.0" encoding="utf-8"?>
 <p:sld xmlns:a="http://schemas.openxmlformats.org/drawingml/2006/main" xmlns:r="http://schemas.openxmlformats.org/officeDocument/2006/relationships" xmlns:p="http://schemas.openxmlformats.org/presentationml/2006/main">
   <p:cSld>
     <p:spTree>

</xml_diff>